<commit_message>
added customer churn image
</commit_message>
<xml_diff>
--- a/AI Academy Apprenticeship Capstone Presentation.pptx
+++ b/AI Academy Apprenticeship Capstone Presentation.pptx
@@ -2788,7 +2788,7 @@
         <a:p>
           <a:r>
             <a:rPr lang="en-US" dirty="0"/>
-            <a:t>Fit dataset into ML Classification Algorithm</a:t>
+            <a:t>Data Fitting </a:t>
           </a:r>
         </a:p>
       </dgm:t>
@@ -3014,34 +3014,34 @@
     </dgm:pt>
   </dgm:ptLst>
   <dgm:cxnLst>
-    <dgm:cxn modelId="{624A9609-9EFF-4C04-82E0-27D4F3F517F2}" type="presOf" srcId="{735EA165-845C-4D12-AB5E-63970E9EC8A1}" destId="{B8525E8C-640D-400B-9609-6A68B032A35C}" srcOrd="0" destOrd="0" presId="urn:microsoft.com/office/officeart/2005/8/layout/hChevron3"/>
-    <dgm:cxn modelId="{A14EF42E-1F3F-4DC3-9BD2-4947A32EC0BC}" type="presOf" srcId="{276459B6-CE5F-4C4B-94D0-98D79DBCB9CB}" destId="{37A46C26-30C7-4990-AF15-4695E6D457EF}" srcOrd="0" destOrd="0" presId="urn:microsoft.com/office/officeart/2005/8/layout/hChevron3"/>
     <dgm:cxn modelId="{899F4342-7EB5-4396-97F6-312E67E85965}" srcId="{735EA165-845C-4D12-AB5E-63970E9EC8A1}" destId="{276459B6-CE5F-4C4B-94D0-98D79DBCB9CB}" srcOrd="4" destOrd="0" parTransId="{0E58CD24-C659-4AE8-85CB-5B5AB7A19CF3}" sibTransId="{4055B57A-6B57-4DD7-80AE-77C809670854}"/>
     <dgm:cxn modelId="{7658C064-F2E8-425F-A68F-A5404C12AC47}" srcId="{735EA165-845C-4D12-AB5E-63970E9EC8A1}" destId="{B240EEC4-01E8-40F6-8C51-7358A0D0F508}" srcOrd="1" destOrd="0" parTransId="{D492A590-8A78-4CF9-BA57-FB5D49B042DC}" sibTransId="{6F5DED86-77FE-44E6-97DE-EDEFD424F386}"/>
+    <dgm:cxn modelId="{788F6866-BA16-4798-95FC-ADA9878D1781}" type="presOf" srcId="{735EA165-845C-4D12-AB5E-63970E9EC8A1}" destId="{B8525E8C-640D-400B-9609-6A68B032A35C}" srcOrd="0" destOrd="0" presId="urn:microsoft.com/office/officeart/2005/8/layout/hChevron3"/>
     <dgm:cxn modelId="{2ACDEE46-6237-460F-A22D-FD7DBBB3F808}" srcId="{735EA165-845C-4D12-AB5E-63970E9EC8A1}" destId="{728B52D5-95C0-4DE1-8918-B1517546441A}" srcOrd="0" destOrd="0" parTransId="{38463D3B-F00F-4E93-AD61-72E342001147}" sibTransId="{8E5F1E7D-00C2-4E3F-B8CE-086DCD4C6D28}"/>
-    <dgm:cxn modelId="{5A737D51-0E29-467E-BA4A-2209FB406BB3}" type="presOf" srcId="{C556A754-7E0A-4004-A3DC-8A0FC7179D74}" destId="{BB0B737C-4F69-4EA3-B6D7-DC986D3CE2A8}" srcOrd="0" destOrd="0" presId="urn:microsoft.com/office/officeart/2005/8/layout/hChevron3"/>
-    <dgm:cxn modelId="{55C52793-81F5-472C-9ABC-794C156C6501}" type="presOf" srcId="{B770EC80-1833-4C34-9877-9D6EDAC19CA4}" destId="{76DFCF9F-70D4-49CE-B944-FFC864420A8F}" srcOrd="0" destOrd="0" presId="urn:microsoft.com/office/officeart/2005/8/layout/hChevron3"/>
+    <dgm:cxn modelId="{AB2F458C-6405-49E2-9E22-F63EAF77D57A}" type="presOf" srcId="{A4089B9E-D30D-4371-9630-BD0147B7A8F2}" destId="{A8E49AE7-DFF4-4587-9228-B8476B06D9D8}" srcOrd="0" destOrd="0" presId="urn:microsoft.com/office/officeart/2005/8/layout/hChevron3"/>
+    <dgm:cxn modelId="{7CC83C93-B610-48BA-AA10-B1EBD9BFF1AC}" type="presOf" srcId="{C556A754-7E0A-4004-A3DC-8A0FC7179D74}" destId="{BB0B737C-4F69-4EA3-B6D7-DC986D3CE2A8}" srcOrd="0" destOrd="0" presId="urn:microsoft.com/office/officeart/2005/8/layout/hChevron3"/>
     <dgm:cxn modelId="{493607B7-7E53-45C0-B92D-4ACEFB4842E5}" srcId="{735EA165-845C-4D12-AB5E-63970E9EC8A1}" destId="{F2B8457E-6A5A-4D14-9B9B-104493DCCFD0}" srcOrd="2" destOrd="0" parTransId="{C7EEE3B2-60F2-4F50-99CD-C6C58D9C3579}" sibTransId="{96A82A94-7034-41F2-BCB7-C7EF4C673D8A}"/>
     <dgm:cxn modelId="{66B234BC-D483-4869-A4E7-6BC1261C4112}" srcId="{735EA165-845C-4D12-AB5E-63970E9EC8A1}" destId="{C556A754-7E0A-4004-A3DC-8A0FC7179D74}" srcOrd="5" destOrd="0" parTransId="{61E4BEE5-67E9-431D-8CFC-2F84522EA802}" sibTransId="{0763988B-CA48-473B-A69E-4A04011EFBCC}"/>
-    <dgm:cxn modelId="{DE924DC2-1FB4-4622-89C7-99DBCA5C2572}" type="presOf" srcId="{A4089B9E-D30D-4371-9630-BD0147B7A8F2}" destId="{A8E49AE7-DFF4-4587-9228-B8476B06D9D8}" srcOrd="0" destOrd="0" presId="urn:microsoft.com/office/officeart/2005/8/layout/hChevron3"/>
+    <dgm:cxn modelId="{E609FCBF-AB14-4C87-A486-B97110D11CDD}" type="presOf" srcId="{728B52D5-95C0-4DE1-8918-B1517546441A}" destId="{02E525AB-062F-40B9-A5FB-BA8711AC67F1}" srcOrd="0" destOrd="0" presId="urn:microsoft.com/office/officeart/2005/8/layout/hChevron3"/>
+    <dgm:cxn modelId="{3994FDC0-9A71-4C0F-AD5B-FE0C1DE556A4}" type="presOf" srcId="{276459B6-CE5F-4C4B-94D0-98D79DBCB9CB}" destId="{37A46C26-30C7-4990-AF15-4695E6D457EF}" srcOrd="0" destOrd="0" presId="urn:microsoft.com/office/officeart/2005/8/layout/hChevron3"/>
     <dgm:cxn modelId="{B4448BCB-5A94-48C7-B13A-1D4EBE46FECE}" srcId="{735EA165-845C-4D12-AB5E-63970E9EC8A1}" destId="{A4089B9E-D30D-4371-9630-BD0147B7A8F2}" srcOrd="3" destOrd="0" parTransId="{E0015C51-64DD-4DB1-807E-98FACF305ABA}" sibTransId="{1EBAE6CC-5BEE-4430-967E-EDE78A3465C5}"/>
-    <dgm:cxn modelId="{0B2F92E1-17DB-45ED-BE32-70F7E495C32B}" type="presOf" srcId="{B240EEC4-01E8-40F6-8C51-7358A0D0F508}" destId="{4A5A4FB7-1880-4C10-90F1-15B4147898D6}" srcOrd="0" destOrd="0" presId="urn:microsoft.com/office/officeart/2005/8/layout/hChevron3"/>
+    <dgm:cxn modelId="{90DA24CE-E5A6-4E71-828B-2CFAAB16A51E}" type="presOf" srcId="{B240EEC4-01E8-40F6-8C51-7358A0D0F508}" destId="{4A5A4FB7-1880-4C10-90F1-15B4147898D6}" srcOrd="0" destOrd="0" presId="urn:microsoft.com/office/officeart/2005/8/layout/hChevron3"/>
+    <dgm:cxn modelId="{B30F50D5-6DF4-40B9-9B4C-8495914F8E66}" type="presOf" srcId="{B770EC80-1833-4C34-9877-9D6EDAC19CA4}" destId="{76DFCF9F-70D4-49CE-B944-FFC864420A8F}" srcOrd="0" destOrd="0" presId="urn:microsoft.com/office/officeart/2005/8/layout/hChevron3"/>
+    <dgm:cxn modelId="{6BBB0AD8-1060-4605-A786-94E037A01751}" type="presOf" srcId="{F2B8457E-6A5A-4D14-9B9B-104493DCCFD0}" destId="{7E73E4B1-0501-4DD1-8C67-B0BD7141A1E2}" srcOrd="0" destOrd="0" presId="urn:microsoft.com/office/officeart/2005/8/layout/hChevron3"/>
     <dgm:cxn modelId="{E2F646EF-285C-45DF-9ECD-BCA982850C44}" srcId="{735EA165-845C-4D12-AB5E-63970E9EC8A1}" destId="{B770EC80-1833-4C34-9877-9D6EDAC19CA4}" srcOrd="6" destOrd="0" parTransId="{4F66B5E2-A78F-4BC9-A52E-0A368D21ED55}" sibTransId="{7B418EFB-3B92-412B-A9A0-B0715330171F}"/>
-    <dgm:cxn modelId="{8C56BAF2-8A17-4659-97F3-FA252F191FB7}" type="presOf" srcId="{728B52D5-95C0-4DE1-8918-B1517546441A}" destId="{02E525AB-062F-40B9-A5FB-BA8711AC67F1}" srcOrd="0" destOrd="0" presId="urn:microsoft.com/office/officeart/2005/8/layout/hChevron3"/>
-    <dgm:cxn modelId="{B7B0C7F4-06F1-47AA-A435-D9CF202348F0}" type="presOf" srcId="{F2B8457E-6A5A-4D14-9B9B-104493DCCFD0}" destId="{7E73E4B1-0501-4DD1-8C67-B0BD7141A1E2}" srcOrd="0" destOrd="0" presId="urn:microsoft.com/office/officeart/2005/8/layout/hChevron3"/>
-    <dgm:cxn modelId="{28AA0C7A-FF49-4B40-983F-1F65F6CFF629}" type="presParOf" srcId="{B8525E8C-640D-400B-9609-6A68B032A35C}" destId="{02E525AB-062F-40B9-A5FB-BA8711AC67F1}" srcOrd="0" destOrd="0" presId="urn:microsoft.com/office/officeart/2005/8/layout/hChevron3"/>
-    <dgm:cxn modelId="{4EA59DAF-5EB8-4F9E-85F4-A2D8FB16DF6B}" type="presParOf" srcId="{B8525E8C-640D-400B-9609-6A68B032A35C}" destId="{AC744D85-D755-40BB-8EC2-83B0EADE9F28}" srcOrd="1" destOrd="0" presId="urn:microsoft.com/office/officeart/2005/8/layout/hChevron3"/>
-    <dgm:cxn modelId="{157254C7-4E07-47A1-9108-4BBD2456D499}" type="presParOf" srcId="{B8525E8C-640D-400B-9609-6A68B032A35C}" destId="{4A5A4FB7-1880-4C10-90F1-15B4147898D6}" srcOrd="2" destOrd="0" presId="urn:microsoft.com/office/officeart/2005/8/layout/hChevron3"/>
-    <dgm:cxn modelId="{D3384918-4D06-45C3-9060-408E4AEC585C}" type="presParOf" srcId="{B8525E8C-640D-400B-9609-6A68B032A35C}" destId="{C8F571DB-BAB4-43FE-8104-8A8E0A5AC438}" srcOrd="3" destOrd="0" presId="urn:microsoft.com/office/officeart/2005/8/layout/hChevron3"/>
-    <dgm:cxn modelId="{73A7BA65-45CC-49A5-A5E9-8AF65C3C0E98}" type="presParOf" srcId="{B8525E8C-640D-400B-9609-6A68B032A35C}" destId="{7E73E4B1-0501-4DD1-8C67-B0BD7141A1E2}" srcOrd="4" destOrd="0" presId="urn:microsoft.com/office/officeart/2005/8/layout/hChevron3"/>
-    <dgm:cxn modelId="{7B186F33-3913-4115-B3A7-8F1A314F1CD8}" type="presParOf" srcId="{B8525E8C-640D-400B-9609-6A68B032A35C}" destId="{B32CFC12-A1A6-4267-B139-8C98524D0DC3}" srcOrd="5" destOrd="0" presId="urn:microsoft.com/office/officeart/2005/8/layout/hChevron3"/>
-    <dgm:cxn modelId="{A19E6127-C5E4-4DAB-8606-156574CB93ED}" type="presParOf" srcId="{B8525E8C-640D-400B-9609-6A68B032A35C}" destId="{A8E49AE7-DFF4-4587-9228-B8476B06D9D8}" srcOrd="6" destOrd="0" presId="urn:microsoft.com/office/officeart/2005/8/layout/hChevron3"/>
-    <dgm:cxn modelId="{EF4677A2-4A9E-4D20-B618-0776503F9F12}" type="presParOf" srcId="{B8525E8C-640D-400B-9609-6A68B032A35C}" destId="{B57655FC-C053-4B44-A89D-F73919A7DE90}" srcOrd="7" destOrd="0" presId="urn:microsoft.com/office/officeart/2005/8/layout/hChevron3"/>
-    <dgm:cxn modelId="{140D3FB7-94A1-4181-8DEE-E14D9EF33A28}" type="presParOf" srcId="{B8525E8C-640D-400B-9609-6A68B032A35C}" destId="{37A46C26-30C7-4990-AF15-4695E6D457EF}" srcOrd="8" destOrd="0" presId="urn:microsoft.com/office/officeart/2005/8/layout/hChevron3"/>
-    <dgm:cxn modelId="{ABCD27A4-5A44-48A6-98F7-58E866A3A106}" type="presParOf" srcId="{B8525E8C-640D-400B-9609-6A68B032A35C}" destId="{754A5059-3BD2-451E-B08C-44F0FB627905}" srcOrd="9" destOrd="0" presId="urn:microsoft.com/office/officeart/2005/8/layout/hChevron3"/>
-    <dgm:cxn modelId="{E5F46199-7A67-4B55-AEEE-022B7DB2EA1F}" type="presParOf" srcId="{B8525E8C-640D-400B-9609-6A68B032A35C}" destId="{BB0B737C-4F69-4EA3-B6D7-DC986D3CE2A8}" srcOrd="10" destOrd="0" presId="urn:microsoft.com/office/officeart/2005/8/layout/hChevron3"/>
-    <dgm:cxn modelId="{B9A4D0F2-51C5-477E-BBAD-6CDCB7B787ED}" type="presParOf" srcId="{B8525E8C-640D-400B-9609-6A68B032A35C}" destId="{B20E5545-1DDD-42FA-8EB4-88D1BE78F99B}" srcOrd="11" destOrd="0" presId="urn:microsoft.com/office/officeart/2005/8/layout/hChevron3"/>
-    <dgm:cxn modelId="{EC1234F6-C2CE-492E-ACB9-E4CBCD188770}" type="presParOf" srcId="{B8525E8C-640D-400B-9609-6A68B032A35C}" destId="{76DFCF9F-70D4-49CE-B944-FFC864420A8F}" srcOrd="12" destOrd="0" presId="urn:microsoft.com/office/officeart/2005/8/layout/hChevron3"/>
+    <dgm:cxn modelId="{F994E267-F308-4100-8F7F-B0F5AE0C577F}" type="presParOf" srcId="{B8525E8C-640D-400B-9609-6A68B032A35C}" destId="{02E525AB-062F-40B9-A5FB-BA8711AC67F1}" srcOrd="0" destOrd="0" presId="urn:microsoft.com/office/officeart/2005/8/layout/hChevron3"/>
+    <dgm:cxn modelId="{4A2F2E43-88F1-4CDE-8846-C70ABABCEB30}" type="presParOf" srcId="{B8525E8C-640D-400B-9609-6A68B032A35C}" destId="{AC744D85-D755-40BB-8EC2-83B0EADE9F28}" srcOrd="1" destOrd="0" presId="urn:microsoft.com/office/officeart/2005/8/layout/hChevron3"/>
+    <dgm:cxn modelId="{3902E876-3148-49E8-A579-EE0BFC65DD50}" type="presParOf" srcId="{B8525E8C-640D-400B-9609-6A68B032A35C}" destId="{4A5A4FB7-1880-4C10-90F1-15B4147898D6}" srcOrd="2" destOrd="0" presId="urn:microsoft.com/office/officeart/2005/8/layout/hChevron3"/>
+    <dgm:cxn modelId="{B9E855C4-07CF-4057-B4BB-7DEF074B05D2}" type="presParOf" srcId="{B8525E8C-640D-400B-9609-6A68B032A35C}" destId="{C8F571DB-BAB4-43FE-8104-8A8E0A5AC438}" srcOrd="3" destOrd="0" presId="urn:microsoft.com/office/officeart/2005/8/layout/hChevron3"/>
+    <dgm:cxn modelId="{53B14553-4F6F-45F9-A9E7-524CFB3D2AEB}" type="presParOf" srcId="{B8525E8C-640D-400B-9609-6A68B032A35C}" destId="{7E73E4B1-0501-4DD1-8C67-B0BD7141A1E2}" srcOrd="4" destOrd="0" presId="urn:microsoft.com/office/officeart/2005/8/layout/hChevron3"/>
+    <dgm:cxn modelId="{E63C8AC9-A9A0-47DA-BF71-EA1AE6E8BF6F}" type="presParOf" srcId="{B8525E8C-640D-400B-9609-6A68B032A35C}" destId="{B32CFC12-A1A6-4267-B139-8C98524D0DC3}" srcOrd="5" destOrd="0" presId="urn:microsoft.com/office/officeart/2005/8/layout/hChevron3"/>
+    <dgm:cxn modelId="{46278C23-A6D4-4EA6-A6D4-78ABD6980938}" type="presParOf" srcId="{B8525E8C-640D-400B-9609-6A68B032A35C}" destId="{A8E49AE7-DFF4-4587-9228-B8476B06D9D8}" srcOrd="6" destOrd="0" presId="urn:microsoft.com/office/officeart/2005/8/layout/hChevron3"/>
+    <dgm:cxn modelId="{5C378657-1ACA-4554-8176-5295BF651CFE}" type="presParOf" srcId="{B8525E8C-640D-400B-9609-6A68B032A35C}" destId="{B57655FC-C053-4B44-A89D-F73919A7DE90}" srcOrd="7" destOrd="0" presId="urn:microsoft.com/office/officeart/2005/8/layout/hChevron3"/>
+    <dgm:cxn modelId="{16145B71-81BC-4B97-8864-601475A1FC2F}" type="presParOf" srcId="{B8525E8C-640D-400B-9609-6A68B032A35C}" destId="{37A46C26-30C7-4990-AF15-4695E6D457EF}" srcOrd="8" destOrd="0" presId="urn:microsoft.com/office/officeart/2005/8/layout/hChevron3"/>
+    <dgm:cxn modelId="{A35D5919-9ED4-466D-BF68-DDDF71047FE9}" type="presParOf" srcId="{B8525E8C-640D-400B-9609-6A68B032A35C}" destId="{754A5059-3BD2-451E-B08C-44F0FB627905}" srcOrd="9" destOrd="0" presId="urn:microsoft.com/office/officeart/2005/8/layout/hChevron3"/>
+    <dgm:cxn modelId="{B374216E-F070-4AA4-8518-856408871135}" type="presParOf" srcId="{B8525E8C-640D-400B-9609-6A68B032A35C}" destId="{BB0B737C-4F69-4EA3-B6D7-DC986D3CE2A8}" srcOrd="10" destOrd="0" presId="urn:microsoft.com/office/officeart/2005/8/layout/hChevron3"/>
+    <dgm:cxn modelId="{B31D9768-8FA5-48DB-B5F4-94093DA53894}" type="presParOf" srcId="{B8525E8C-640D-400B-9609-6A68B032A35C}" destId="{B20E5545-1DDD-42FA-8EB4-88D1BE78F99B}" srcOrd="11" destOrd="0" presId="urn:microsoft.com/office/officeart/2005/8/layout/hChevron3"/>
+    <dgm:cxn modelId="{25EA772F-A998-4906-A8A2-DE86DDA81758}" type="presParOf" srcId="{B8525E8C-640D-400B-9609-6A68B032A35C}" destId="{76DFCF9F-70D4-49CE-B944-FFC864420A8F}" srcOrd="12" destOrd="0" presId="urn:microsoft.com/office/officeart/2005/8/layout/hChevron3"/>
   </dgm:cxnLst>
   <dgm:bg/>
   <dgm:whole/>
@@ -3803,12 +3803,12 @@
         </a:fontRef>
       </dsp:style>
       <dsp:txBody>
-        <a:bodyPr spcFirstLastPara="0" vert="horz" wrap="square" lIns="58674" tIns="29337" rIns="14669" bIns="29337" numCol="1" spcCol="1270" anchor="ctr" anchorCtr="0">
+        <a:bodyPr spcFirstLastPara="0" vert="horz" wrap="square" lIns="69342" tIns="34671" rIns="17336" bIns="34671" numCol="1" spcCol="1270" anchor="ctr" anchorCtr="0">
           <a:noAutofit/>
         </a:bodyPr>
         <a:lstStyle/>
         <a:p>
-          <a:pPr marL="0" lvl="0" indent="0" algn="ctr" defTabSz="488950">
+          <a:pPr marL="0" lvl="0" indent="0" algn="ctr" defTabSz="577850">
             <a:lnSpc>
               <a:spcPct val="90000"/>
             </a:lnSpc>
@@ -3821,7 +3821,7 @@
             <a:buNone/>
           </a:pPr>
           <a:r>
-            <a:rPr lang="en-US" sz="1100" kern="1200" dirty="0"/>
+            <a:rPr lang="en-US" sz="1300" kern="1200" dirty="0"/>
             <a:t>Select Dataset</a:t>
           </a:r>
         </a:p>
@@ -3881,12 +3881,12 @@
         </a:fontRef>
       </dsp:style>
       <dsp:txBody>
-        <a:bodyPr spcFirstLastPara="0" vert="horz" wrap="square" lIns="44006" tIns="29337" rIns="14669" bIns="29337" numCol="1" spcCol="1270" anchor="ctr" anchorCtr="0">
+        <a:bodyPr spcFirstLastPara="0" vert="horz" wrap="square" lIns="52007" tIns="34671" rIns="17336" bIns="34671" numCol="1" spcCol="1270" anchor="ctr" anchorCtr="0">
           <a:noAutofit/>
         </a:bodyPr>
         <a:lstStyle/>
         <a:p>
-          <a:pPr marL="0" lvl="0" indent="0" algn="ctr" defTabSz="488950">
+          <a:pPr marL="0" lvl="0" indent="0" algn="ctr" defTabSz="577850">
             <a:lnSpc>
               <a:spcPct val="90000"/>
             </a:lnSpc>
@@ -3899,7 +3899,7 @@
             <a:buNone/>
           </a:pPr>
           <a:r>
-            <a:rPr lang="en-US" sz="1100" kern="1200" dirty="0"/>
+            <a:rPr lang="en-US" sz="1300" kern="1200" dirty="0"/>
             <a:t>Data Preprocessing</a:t>
           </a:r>
         </a:p>
@@ -3959,12 +3959,12 @@
         </a:fontRef>
       </dsp:style>
       <dsp:txBody>
-        <a:bodyPr spcFirstLastPara="0" vert="horz" wrap="square" lIns="44006" tIns="29337" rIns="14669" bIns="29337" numCol="1" spcCol="1270" anchor="ctr" anchorCtr="0">
+        <a:bodyPr spcFirstLastPara="0" vert="horz" wrap="square" lIns="52007" tIns="34671" rIns="17336" bIns="34671" numCol="1" spcCol="1270" anchor="ctr" anchorCtr="0">
           <a:noAutofit/>
         </a:bodyPr>
         <a:lstStyle/>
         <a:p>
-          <a:pPr marL="0" lvl="0" indent="0" algn="ctr" defTabSz="488950">
+          <a:pPr marL="0" lvl="0" indent="0" algn="ctr" defTabSz="577850">
             <a:lnSpc>
               <a:spcPct val="90000"/>
             </a:lnSpc>
@@ -3977,7 +3977,7 @@
             <a:buNone/>
           </a:pPr>
           <a:r>
-            <a:rPr lang="en-US" sz="1100" kern="1200" dirty="0"/>
+            <a:rPr lang="en-US" sz="1300" kern="1200" dirty="0"/>
             <a:t>Exploratory Data Analysis</a:t>
           </a:r>
         </a:p>
@@ -4037,12 +4037,12 @@
         </a:fontRef>
       </dsp:style>
       <dsp:txBody>
-        <a:bodyPr spcFirstLastPara="0" vert="horz" wrap="square" lIns="44006" tIns="29337" rIns="14669" bIns="29337" numCol="1" spcCol="1270" anchor="ctr" anchorCtr="0">
+        <a:bodyPr spcFirstLastPara="0" vert="horz" wrap="square" lIns="52007" tIns="34671" rIns="17336" bIns="34671" numCol="1" spcCol="1270" anchor="ctr" anchorCtr="0">
           <a:noAutofit/>
         </a:bodyPr>
         <a:lstStyle/>
         <a:p>
-          <a:pPr marL="0" lvl="0" indent="0" algn="ctr" defTabSz="488950">
+          <a:pPr marL="0" lvl="0" indent="0" algn="ctr" defTabSz="577850">
             <a:lnSpc>
               <a:spcPct val="90000"/>
             </a:lnSpc>
@@ -4055,8 +4055,8 @@
             <a:buNone/>
           </a:pPr>
           <a:r>
-            <a:rPr lang="en-US" sz="1100" kern="1200" dirty="0"/>
-            <a:t>Fit dataset into ML Classification Algorithm</a:t>
+            <a:rPr lang="en-US" sz="1300" kern="1200" dirty="0"/>
+            <a:t>Data Fitting </a:t>
           </a:r>
         </a:p>
       </dsp:txBody>
@@ -4115,12 +4115,12 @@
         </a:fontRef>
       </dsp:style>
       <dsp:txBody>
-        <a:bodyPr spcFirstLastPara="0" vert="horz" wrap="square" lIns="44006" tIns="29337" rIns="14669" bIns="29337" numCol="1" spcCol="1270" anchor="ctr" anchorCtr="0">
+        <a:bodyPr spcFirstLastPara="0" vert="horz" wrap="square" lIns="52007" tIns="34671" rIns="17336" bIns="34671" numCol="1" spcCol="1270" anchor="ctr" anchorCtr="0">
           <a:noAutofit/>
         </a:bodyPr>
         <a:lstStyle/>
         <a:p>
-          <a:pPr marL="0" lvl="0" indent="0" algn="ctr" defTabSz="488950">
+          <a:pPr marL="0" lvl="0" indent="0" algn="ctr" defTabSz="577850">
             <a:lnSpc>
               <a:spcPct val="90000"/>
             </a:lnSpc>
@@ -4133,7 +4133,7 @@
             <a:buNone/>
           </a:pPr>
           <a:r>
-            <a:rPr lang="en-US" sz="1100" kern="1200" dirty="0"/>
+            <a:rPr lang="en-US" sz="1300" kern="1200" dirty="0"/>
             <a:t>Determine the most accurate algorithm</a:t>
           </a:r>
         </a:p>
@@ -4193,12 +4193,12 @@
         </a:fontRef>
       </dsp:style>
       <dsp:txBody>
-        <a:bodyPr spcFirstLastPara="0" vert="horz" wrap="square" lIns="44006" tIns="29337" rIns="14669" bIns="29337" numCol="1" spcCol="1270" anchor="ctr" anchorCtr="0">
+        <a:bodyPr spcFirstLastPara="0" vert="horz" wrap="square" lIns="52007" tIns="34671" rIns="17336" bIns="34671" numCol="1" spcCol="1270" anchor="ctr" anchorCtr="0">
           <a:noAutofit/>
         </a:bodyPr>
         <a:lstStyle/>
         <a:p>
-          <a:pPr marL="0" lvl="0" indent="0" algn="ctr" defTabSz="488950">
+          <a:pPr marL="0" lvl="0" indent="0" algn="ctr" defTabSz="577850">
             <a:lnSpc>
               <a:spcPct val="90000"/>
             </a:lnSpc>
@@ -4211,7 +4211,7 @@
             <a:buNone/>
           </a:pPr>
           <a:r>
-            <a:rPr lang="en-US" sz="1100" kern="1200" dirty="0"/>
+            <a:rPr lang="en-US" sz="1300" kern="1200" dirty="0"/>
             <a:t>Feature Plotting</a:t>
           </a:r>
         </a:p>
@@ -4271,12 +4271,12 @@
         </a:fontRef>
       </dsp:style>
       <dsp:txBody>
-        <a:bodyPr spcFirstLastPara="0" vert="horz" wrap="square" lIns="44006" tIns="29337" rIns="14669" bIns="29337" numCol="1" spcCol="1270" anchor="ctr" anchorCtr="0">
+        <a:bodyPr spcFirstLastPara="0" vert="horz" wrap="square" lIns="52007" tIns="34671" rIns="17336" bIns="34671" numCol="1" spcCol="1270" anchor="ctr" anchorCtr="0">
           <a:noAutofit/>
         </a:bodyPr>
         <a:lstStyle/>
         <a:p>
-          <a:pPr marL="0" lvl="0" indent="0" algn="ctr" defTabSz="488950">
+          <a:pPr marL="0" lvl="0" indent="0" algn="ctr" defTabSz="577850">
             <a:lnSpc>
               <a:spcPct val="90000"/>
             </a:lnSpc>
@@ -4289,7 +4289,7 @@
             <a:buNone/>
           </a:pPr>
           <a:r>
-            <a:rPr lang="en-US" sz="1100" kern="1200" dirty="0"/>
+            <a:rPr lang="en-US" sz="1300" kern="1200" dirty="0"/>
             <a:t>Analysis of Results</a:t>
           </a:r>
         </a:p>
@@ -8470,7 +8470,7 @@
           <a:p>
             <a:fld id="{C291D4F5-7D09-4B10-BA56-79A69A59EEAB}" type="datetimeFigureOut">
               <a:rPr lang="en-US" smtClean="0"/>
-              <a:t>2/2/2023</a:t>
+              <a:t>2/3/2023</a:t>
             </a:fld>
             <a:endParaRPr lang="en-US"/>
           </a:p>
@@ -10968,7 +10968,7 @@
           <a:p>
             <a:fld id="{2C1A966C-A89D-4EB9-8003-0633EC451FA2}" type="datetimeFigureOut">
               <a:rPr lang="en-US" smtClean="0"/>
-              <a:t>2/2/2023</a:t>
+              <a:t>2/3/2023</a:t>
             </a:fld>
             <a:endParaRPr lang="en-US"/>
           </a:p>
@@ -11138,7 +11138,7 @@
           <a:p>
             <a:fld id="{2C1A966C-A89D-4EB9-8003-0633EC451FA2}" type="datetimeFigureOut">
               <a:rPr lang="en-US" smtClean="0"/>
-              <a:t>2/2/2023</a:t>
+              <a:t>2/3/2023</a:t>
             </a:fld>
             <a:endParaRPr lang="en-US"/>
           </a:p>
@@ -11318,7 +11318,7 @@
           <a:p>
             <a:fld id="{2C1A966C-A89D-4EB9-8003-0633EC451FA2}" type="datetimeFigureOut">
               <a:rPr lang="en-US" smtClean="0"/>
-              <a:t>2/2/2023</a:t>
+              <a:t>2/3/2023</a:t>
             </a:fld>
             <a:endParaRPr lang="en-US"/>
           </a:p>
@@ -20216,7 +20216,7 @@
           <a:p>
             <a:fld id="{2C1A966C-A89D-4EB9-8003-0633EC451FA2}" type="datetimeFigureOut">
               <a:rPr lang="en-US" smtClean="0"/>
-              <a:t>2/2/2023</a:t>
+              <a:t>2/3/2023</a:t>
             </a:fld>
             <a:endParaRPr lang="en-US"/>
           </a:p>
@@ -20462,7 +20462,7 @@
           <a:p>
             <a:fld id="{2C1A966C-A89D-4EB9-8003-0633EC451FA2}" type="datetimeFigureOut">
               <a:rPr lang="en-US" smtClean="0"/>
-              <a:t>2/2/2023</a:t>
+              <a:t>2/3/2023</a:t>
             </a:fld>
             <a:endParaRPr lang="en-US"/>
           </a:p>
@@ -20694,7 +20694,7 @@
           <a:p>
             <a:fld id="{2C1A966C-A89D-4EB9-8003-0633EC451FA2}" type="datetimeFigureOut">
               <a:rPr lang="en-US" smtClean="0"/>
-              <a:t>2/2/2023</a:t>
+              <a:t>2/3/2023</a:t>
             </a:fld>
             <a:endParaRPr lang="en-US"/>
           </a:p>
@@ -21061,7 +21061,7 @@
           <a:p>
             <a:fld id="{2C1A966C-A89D-4EB9-8003-0633EC451FA2}" type="datetimeFigureOut">
               <a:rPr lang="en-US" smtClean="0"/>
-              <a:t>2/2/2023</a:t>
+              <a:t>2/3/2023</a:t>
             </a:fld>
             <a:endParaRPr lang="en-US"/>
           </a:p>
@@ -21179,7 +21179,7 @@
           <a:p>
             <a:fld id="{2C1A966C-A89D-4EB9-8003-0633EC451FA2}" type="datetimeFigureOut">
               <a:rPr lang="en-US" smtClean="0"/>
-              <a:t>2/2/2023</a:t>
+              <a:t>2/3/2023</a:t>
             </a:fld>
             <a:endParaRPr lang="en-US"/>
           </a:p>
@@ -21274,7 +21274,7 @@
           <a:p>
             <a:fld id="{2C1A966C-A89D-4EB9-8003-0633EC451FA2}" type="datetimeFigureOut">
               <a:rPr lang="en-US" smtClean="0"/>
-              <a:t>2/2/2023</a:t>
+              <a:t>2/3/2023</a:t>
             </a:fld>
             <a:endParaRPr lang="en-US"/>
           </a:p>
@@ -21551,7 +21551,7 @@
           <a:p>
             <a:fld id="{2C1A966C-A89D-4EB9-8003-0633EC451FA2}" type="datetimeFigureOut">
               <a:rPr lang="en-US" smtClean="0"/>
-              <a:t>2/2/2023</a:t>
+              <a:t>2/3/2023</a:t>
             </a:fld>
             <a:endParaRPr lang="en-US"/>
           </a:p>
@@ -21808,7 +21808,7 @@
           <a:p>
             <a:fld id="{2C1A966C-A89D-4EB9-8003-0633EC451FA2}" type="datetimeFigureOut">
               <a:rPr lang="en-US" smtClean="0"/>
-              <a:t>2/2/2023</a:t>
+              <a:t>2/3/2023</a:t>
             </a:fld>
             <a:endParaRPr lang="en-US"/>
           </a:p>
@@ -22021,7 +22021,7 @@
           <a:p>
             <a:fld id="{2C1A966C-A89D-4EB9-8003-0633EC451FA2}" type="datetimeFigureOut">
               <a:rPr lang="en-US" smtClean="0"/>
-              <a:t>2/2/2023</a:t>
+              <a:t>2/3/2023</a:t>
             </a:fld>
             <a:endParaRPr lang="en-US"/>
           </a:p>
@@ -22694,7 +22694,7 @@
             <p:ph idx="1"/>
             <p:extLst>
               <p:ext uri="{D42A27DB-BD31-4B8C-83A1-F6EECF244321}">
-                <p14:modId xmlns:p14="http://schemas.microsoft.com/office/powerpoint/2010/main" val="2425750517"/>
+                <p14:modId xmlns:p14="http://schemas.microsoft.com/office/powerpoint/2010/main" val="324787970"/>
               </p:ext>
             </p:extLst>
           </p:nvPr>
@@ -23528,7 +23528,7 @@
           <a:lstStyle/>
           <a:p>
             <a:r>
-              <a:rPr lang="en-US" sz="3600" dirty="0">
+              <a:rPr lang="en-US" sz="3600">
                 <a:solidFill>
                   <a:schemeClr val="accent1"/>
                 </a:solidFill>
@@ -23538,6 +23538,14 @@
               </a:rPr>
               <a:t>Feature Evaluation</a:t>
             </a:r>
+            <a:endParaRPr lang="en-US" sz="3600" dirty="0">
+              <a:solidFill>
+                <a:schemeClr val="accent1"/>
+              </a:solidFill>
+              <a:latin typeface="Calibri Light" panose="020F0302020204030204" pitchFamily="34" charset="0"/>
+              <a:ea typeface="Open Sans" panose="020B0606030504020204" pitchFamily="34" charset="0"/>
+              <a:cs typeface="Calibri Light" panose="020F0302020204030204" pitchFamily="34" charset="0"/>
+            </a:endParaRPr>
           </a:p>
         </p:txBody>
       </p:sp>
@@ -23565,8 +23573,8 @@
         </p:blipFill>
         <p:spPr>
           <a:xfrm>
-            <a:off x="-176204" y="2326666"/>
-            <a:ext cx="6631969" cy="3836139"/>
+            <a:off x="-62439" y="2392471"/>
+            <a:ext cx="6518204" cy="3770334"/>
           </a:xfrm>
         </p:spPr>
       </p:pic>
@@ -27704,7 +27712,7 @@
         </p:nvSpPr>
         <p:spPr>
           <a:xfrm>
-            <a:off x="-1226048" y="1661553"/>
+            <a:off x="3113070" y="4731083"/>
             <a:ext cx="5965860" cy="2644650"/>
           </a:xfrm>
         </p:spPr>
@@ -27742,7 +27750,7 @@
         </p:nvSpPr>
         <p:spPr>
           <a:xfrm>
-            <a:off x="352539" y="5203949"/>
+            <a:off x="4532368" y="5189112"/>
             <a:ext cx="4153359" cy="338554"/>
           </a:xfrm>
           <a:prstGeom prst="rect">
@@ -27770,6 +27778,53 @@
           </a:p>
         </p:txBody>
       </p:sp>
+      <p:pic>
+        <p:nvPicPr>
+          <p:cNvPr id="1026" name="Picture 2" descr="10 Tips to Get Started with Kaggle | by ODSC - Open Data Science | Medium">
+            <a:extLst>
+              <a:ext uri="{FF2B5EF4-FFF2-40B4-BE49-F238E27FC236}">
+                <a16:creationId xmlns:a16="http://schemas.microsoft.com/office/drawing/2014/main" id="{F7C0EEF2-A79A-459D-92D8-B63E28E9B954}"/>
+              </a:ext>
+            </a:extLst>
+          </p:cNvPr>
+          <p:cNvPicPr>
+            <a:picLocks noChangeAspect="1" noChangeArrowheads="1"/>
+          </p:cNvPicPr>
+          <p:nvPr/>
+        </p:nvPicPr>
+        <p:blipFill>
+          <a:blip r:embed="rId3">
+            <a:extLst>
+              <a:ext uri="{28A0092B-C50C-407E-A947-70E740481C1C}">
+                <a14:useLocalDpi xmlns:a14="http://schemas.microsoft.com/office/drawing/2010/main" val="0"/>
+              </a:ext>
+            </a:extLst>
+          </a:blip>
+          <a:srcRect/>
+          <a:stretch>
+            <a:fillRect/>
+          </a:stretch>
+        </p:blipFill>
+        <p:spPr bwMode="auto">
+          <a:xfrm>
+            <a:off x="3677213" y="1952735"/>
+            <a:ext cx="4837574" cy="2267613"/>
+          </a:xfrm>
+          <a:prstGeom prst="rect">
+            <a:avLst/>
+          </a:prstGeom>
+          <a:noFill/>
+          <a:extLst>
+            <a:ext uri="{909E8E84-426E-40DD-AFC4-6F175D3DCCD1}">
+              <a14:hiddenFill xmlns:a14="http://schemas.microsoft.com/office/drawing/2010/main">
+                <a:solidFill>
+                  <a:srgbClr val="FFFFFF"/>
+                </a:solidFill>
+              </a14:hiddenFill>
+            </a:ext>
+          </a:extLst>
+        </p:spPr>
+      </p:pic>
     </p:spTree>
     <p:extLst>
       <p:ext uri="{BB962C8B-B14F-4D97-AF65-F5344CB8AC3E}">

</xml_diff>